<commit_message>
IZMENJEN PPT, DODAT PDF FINALNI
</commit_message>
<xml_diff>
--- a/PacManAgent.pptx
+++ b/PacManAgent.pptx
@@ -303,7 +303,8 @@
           <a:p>
             <a:fld id="{4AAD347D-5ACD-4C99-B74B-A9C85AD731AF}" type="datetimeFigureOut">
               <a:rPr lang="en-US" dirty="0"/>
-              <a:t>12/14/2015</a:t>
+              <a:pPr/>
+              <a:t>2/5/2016</a:t>
             </a:fld>
             <a:endParaRPr lang="en-US" dirty="0"/>
           </a:p>
@@ -345,6 +346,7 @@
           <a:p>
             <a:fld id="{D57F1E4F-1CFF-5643-939E-02111984F565}" type="slidenum">
               <a:rPr lang="en-US" dirty="0"/>
+              <a:pPr/>
               <a:t>‹#›</a:t>
             </a:fld>
             <a:endParaRPr lang="en-US" dirty="0"/>
@@ -573,7 +575,8 @@
           <a:p>
             <a:fld id="{4509A250-FF31-4206-8172-F9D3106AACB1}" type="datetimeFigureOut">
               <a:rPr lang="en-US" dirty="0"/>
-              <a:t>12/14/2015</a:t>
+              <a:pPr/>
+              <a:t>2/5/2016</a:t>
             </a:fld>
             <a:endParaRPr lang="en-US" dirty="0"/>
           </a:p>
@@ -615,6 +618,7 @@
           <a:p>
             <a:fld id="{D57F1E4F-1CFF-5643-939E-02111984F565}" type="slidenum">
               <a:rPr lang="en-US" dirty="0"/>
+              <a:pPr/>
               <a:t>‹#›</a:t>
             </a:fld>
             <a:endParaRPr lang="en-US" dirty="0"/>
@@ -762,7 +766,8 @@
           <a:p>
             <a:fld id="{4509A250-FF31-4206-8172-F9D3106AACB1}" type="datetimeFigureOut">
               <a:rPr lang="en-US" dirty="0"/>
-              <a:t>12/14/2015</a:t>
+              <a:pPr/>
+              <a:t>2/5/2016</a:t>
             </a:fld>
             <a:endParaRPr lang="en-US" dirty="0"/>
           </a:p>
@@ -804,6 +809,7 @@
           <a:p>
             <a:fld id="{D57F1E4F-1CFF-5643-939E-02111984F565}" type="slidenum">
               <a:rPr lang="en-US" dirty="0"/>
+              <a:pPr/>
               <a:t>‹#›</a:t>
             </a:fld>
             <a:endParaRPr lang="en-US" dirty="0"/>
@@ -1030,7 +1036,8 @@
           <a:p>
             <a:fld id="{4509A250-FF31-4206-8172-F9D3106AACB1}" type="datetimeFigureOut">
               <a:rPr lang="en-US" dirty="0"/>
-              <a:t>12/14/2015</a:t>
+              <a:pPr/>
+              <a:t>2/5/2016</a:t>
             </a:fld>
             <a:endParaRPr lang="en-US" dirty="0"/>
           </a:p>
@@ -1072,6 +1079,7 @@
           <a:p>
             <a:fld id="{D57F1E4F-1CFF-5643-939E-02111984F565}" type="slidenum">
               <a:rPr lang="en-US" dirty="0"/>
+              <a:pPr/>
               <a:t>‹#›</a:t>
             </a:fld>
             <a:endParaRPr lang="en-US" dirty="0"/>
@@ -1366,7 +1374,8 @@
           <a:p>
             <a:fld id="{4509A250-FF31-4206-8172-F9D3106AACB1}" type="datetimeFigureOut">
               <a:rPr lang="en-US" dirty="0"/>
-              <a:t>12/14/2015</a:t>
+              <a:pPr/>
+              <a:t>2/5/2016</a:t>
             </a:fld>
             <a:endParaRPr lang="en-US" dirty="0"/>
           </a:p>
@@ -1408,6 +1417,7 @@
           <a:p>
             <a:fld id="{D57F1E4F-1CFF-5643-939E-02111984F565}" type="slidenum">
               <a:rPr lang="en-US" dirty="0"/>
+              <a:pPr/>
               <a:t>‹#›</a:t>
             </a:fld>
             <a:endParaRPr lang="en-US" dirty="0"/>
@@ -1984,7 +1994,8 @@
           <a:p>
             <a:fld id="{4509A250-FF31-4206-8172-F9D3106AACB1}" type="datetimeFigureOut">
               <a:rPr lang="en-US" dirty="0"/>
-              <a:t>12/14/2015</a:t>
+              <a:pPr/>
+              <a:t>2/5/2016</a:t>
             </a:fld>
             <a:endParaRPr lang="en-US" dirty="0"/>
           </a:p>
@@ -2026,6 +2037,7 @@
           <a:p>
             <a:fld id="{D57F1E4F-1CFF-5643-939E-02111984F565}" type="slidenum">
               <a:rPr lang="en-US" dirty="0"/>
+              <a:pPr/>
               <a:t>‹#›</a:t>
             </a:fld>
             <a:endParaRPr lang="en-US" dirty="0"/>
@@ -2839,7 +2851,8 @@
           <a:p>
             <a:fld id="{4509A250-FF31-4206-8172-F9D3106AACB1}" type="datetimeFigureOut">
               <a:rPr lang="en-US" dirty="0"/>
-              <a:t>12/14/2015</a:t>
+              <a:pPr/>
+              <a:t>2/5/2016</a:t>
             </a:fld>
             <a:endParaRPr lang="en-US" dirty="0"/>
           </a:p>
@@ -2881,6 +2894,7 @@
           <a:p>
             <a:fld id="{D57F1E4F-1CFF-5643-939E-02111984F565}" type="slidenum">
               <a:rPr lang="en-US" dirty="0"/>
+              <a:pPr/>
               <a:t>‹#›</a:t>
             </a:fld>
             <a:endParaRPr lang="en-US" dirty="0"/>
@@ -3004,7 +3018,8 @@
           <a:p>
             <a:fld id="{4509A250-FF31-4206-8172-F9D3106AACB1}" type="datetimeFigureOut">
               <a:rPr lang="en-US" dirty="0"/>
-              <a:t>12/14/2015</a:t>
+              <a:pPr/>
+              <a:t>2/5/2016</a:t>
             </a:fld>
             <a:endParaRPr lang="en-US" dirty="0"/>
           </a:p>
@@ -3046,6 +3061,7 @@
           <a:p>
             <a:fld id="{D57F1E4F-1CFF-5643-939E-02111984F565}" type="slidenum">
               <a:rPr lang="en-US" dirty="0"/>
+              <a:pPr/>
               <a:t>‹#›</a:t>
             </a:fld>
             <a:endParaRPr lang="en-US" dirty="0"/>
@@ -3179,7 +3195,8 @@
           <a:p>
             <a:fld id="{4509A250-FF31-4206-8172-F9D3106AACB1}" type="datetimeFigureOut">
               <a:rPr lang="en-US" dirty="0"/>
-              <a:t>12/14/2015</a:t>
+              <a:pPr/>
+              <a:t>2/5/2016</a:t>
             </a:fld>
             <a:endParaRPr lang="en-US" dirty="0"/>
           </a:p>
@@ -3221,6 +3238,7 @@
           <a:p>
             <a:fld id="{D57F1E4F-1CFF-5643-939E-02111984F565}" type="slidenum">
               <a:rPr lang="en-US" dirty="0"/>
+              <a:pPr/>
               <a:t>‹#›</a:t>
             </a:fld>
             <a:endParaRPr lang="en-US" dirty="0"/>
@@ -3344,7 +3362,8 @@
           <a:p>
             <a:fld id="{4509A250-FF31-4206-8172-F9D3106AACB1}" type="datetimeFigureOut">
               <a:rPr lang="en-US" dirty="0"/>
-              <a:t>12/14/2015</a:t>
+              <a:pPr/>
+              <a:t>2/5/2016</a:t>
             </a:fld>
             <a:endParaRPr lang="en-US" dirty="0"/>
           </a:p>
@@ -3386,6 +3405,7 @@
           <a:p>
             <a:fld id="{D57F1E4F-1CFF-5643-939E-02111984F565}" type="slidenum">
               <a:rPr lang="en-US" dirty="0"/>
+              <a:pPr/>
               <a:t>‹#›</a:t>
             </a:fld>
             <a:endParaRPr lang="en-US" dirty="0"/>
@@ -3586,7 +3606,8 @@
           <a:p>
             <a:fld id="{9796027F-7875-4030-9381-8BD8C4F21935}" type="datetimeFigureOut">
               <a:rPr lang="en-US" dirty="0"/>
-              <a:t>12/14/2015</a:t>
+              <a:pPr/>
+              <a:t>2/5/2016</a:t>
             </a:fld>
             <a:endParaRPr lang="en-US" dirty="0"/>
           </a:p>
@@ -3628,6 +3649,7 @@
           <a:p>
             <a:fld id="{D57F1E4F-1CFF-5643-939E-02111984F565}" type="slidenum">
               <a:rPr lang="en-US" dirty="0"/>
+              <a:pPr/>
               <a:t>‹#›</a:t>
             </a:fld>
             <a:endParaRPr lang="en-US" dirty="0"/>
@@ -3873,7 +3895,8 @@
           <a:p>
             <a:fld id="{9796027F-7875-4030-9381-8BD8C4F21935}" type="datetimeFigureOut">
               <a:rPr lang="en-US" dirty="0"/>
-              <a:t>12/14/2015</a:t>
+              <a:pPr/>
+              <a:t>2/5/2016</a:t>
             </a:fld>
             <a:endParaRPr lang="en-US" dirty="0"/>
           </a:p>
@@ -3915,6 +3938,7 @@
           <a:p>
             <a:fld id="{D57F1E4F-1CFF-5643-939E-02111984F565}" type="slidenum">
               <a:rPr lang="en-US" dirty="0"/>
+              <a:pPr/>
               <a:t>‹#›</a:t>
             </a:fld>
             <a:endParaRPr lang="en-US" dirty="0"/>
@@ -4312,7 +4336,8 @@
           <a:p>
             <a:fld id="{9796027F-7875-4030-9381-8BD8C4F21935}" type="datetimeFigureOut">
               <a:rPr lang="en-US" dirty="0"/>
-              <a:t>12/14/2015</a:t>
+              <a:pPr/>
+              <a:t>2/5/2016</a:t>
             </a:fld>
             <a:endParaRPr lang="en-US" dirty="0"/>
           </a:p>
@@ -4354,6 +4379,7 @@
           <a:p>
             <a:fld id="{D57F1E4F-1CFF-5643-939E-02111984F565}" type="slidenum">
               <a:rPr lang="en-US" dirty="0"/>
+              <a:pPr/>
               <a:t>‹#›</a:t>
             </a:fld>
             <a:endParaRPr lang="en-US" dirty="0"/>
@@ -4425,7 +4451,8 @@
           <a:p>
             <a:fld id="{4509A250-FF31-4206-8172-F9D3106AACB1}" type="datetimeFigureOut">
               <a:rPr lang="en-US" dirty="0"/>
-              <a:t>12/14/2015</a:t>
+              <a:pPr/>
+              <a:t>2/5/2016</a:t>
             </a:fld>
             <a:endParaRPr lang="en-US" dirty="0"/>
           </a:p>
@@ -4467,6 +4494,7 @@
           <a:p>
             <a:fld id="{D57F1E4F-1CFF-5643-939E-02111984F565}" type="slidenum">
               <a:rPr lang="en-US" dirty="0"/>
+              <a:pPr/>
               <a:t>‹#›</a:t>
             </a:fld>
             <a:endParaRPr lang="en-US" dirty="0"/>
@@ -4515,7 +4543,8 @@
           <a:p>
             <a:fld id="{4509A250-FF31-4206-8172-F9D3106AACB1}" type="datetimeFigureOut">
               <a:rPr lang="en-US" dirty="0"/>
-              <a:t>12/14/2015</a:t>
+              <a:pPr/>
+              <a:t>2/5/2016</a:t>
             </a:fld>
             <a:endParaRPr lang="en-US" dirty="0"/>
           </a:p>
@@ -4557,6 +4586,7 @@
           <a:p>
             <a:fld id="{D57F1E4F-1CFF-5643-939E-02111984F565}" type="slidenum">
               <a:rPr lang="en-US" dirty="0"/>
+              <a:pPr/>
               <a:t>‹#›</a:t>
             </a:fld>
             <a:endParaRPr lang="en-US" dirty="0"/>
@@ -4789,7 +4819,8 @@
           <a:p>
             <a:fld id="{4509A250-FF31-4206-8172-F9D3106AACB1}" type="datetimeFigureOut">
               <a:rPr lang="en-US" dirty="0"/>
-              <a:t>12/14/2015</a:t>
+              <a:pPr/>
+              <a:t>2/5/2016</a:t>
             </a:fld>
             <a:endParaRPr lang="en-US" dirty="0"/>
           </a:p>
@@ -4831,6 +4862,7 @@
           <a:p>
             <a:fld id="{D57F1E4F-1CFF-5643-939E-02111984F565}" type="slidenum">
               <a:rPr lang="en-US" dirty="0"/>
+              <a:pPr/>
               <a:t>‹#›</a:t>
             </a:fld>
             <a:endParaRPr lang="en-US" dirty="0"/>
@@ -5059,7 +5091,8 @@
           <a:p>
             <a:fld id="{4509A250-FF31-4206-8172-F9D3106AACB1}" type="datetimeFigureOut">
               <a:rPr lang="en-US" dirty="0"/>
-              <a:t>12/14/2015</a:t>
+              <a:pPr/>
+              <a:t>2/5/2016</a:t>
             </a:fld>
             <a:endParaRPr lang="en-US" dirty="0"/>
           </a:p>
@@ -5101,6 +5134,7 @@
           <a:p>
             <a:fld id="{D57F1E4F-1CFF-5643-939E-02111984F565}" type="slidenum">
               <a:rPr lang="en-US" dirty="0"/>
+              <a:pPr/>
               <a:t>‹#›</a:t>
             </a:fld>
             <a:endParaRPr lang="en-US" dirty="0"/>
@@ -5149,7 +5183,7 @@
           <a:blip r:embed="rId19">
             <a:extLst>
               <a:ext uri="{28A0092B-C50C-407E-A947-70E740481C1C}">
-                <a14:useLocalDpi xmlns:a14="http://schemas.microsoft.com/office/drawing/2010/main" val="0"/>
+                <a14:useLocalDpi xmlns:a14="http://schemas.microsoft.com/office/drawing/2010/main" xmlns="" val="0"/>
               </a:ext>
             </a:extLst>
           </a:blip>
@@ -5178,7 +5212,7 @@
           <a:blip r:embed="rId20">
             <a:extLst>
               <a:ext uri="{28A0092B-C50C-407E-A947-70E740481C1C}">
-                <a14:useLocalDpi xmlns:a14="http://schemas.microsoft.com/office/drawing/2010/main" val="0"/>
+                <a14:useLocalDpi xmlns:a14="http://schemas.microsoft.com/office/drawing/2010/main" xmlns="" val="0"/>
               </a:ext>
             </a:extLst>
           </a:blip>
@@ -5270,7 +5304,7 @@
           <a:blip r:embed="rId21">
             <a:extLst>
               <a:ext uri="{28A0092B-C50C-407E-A947-70E740481C1C}">
-                <a14:useLocalDpi xmlns:a14="http://schemas.microsoft.com/office/drawing/2010/main" val="0"/>
+                <a14:useLocalDpi xmlns:a14="http://schemas.microsoft.com/office/drawing/2010/main" xmlns="" val="0"/>
               </a:ext>
             </a:extLst>
           </a:blip>
@@ -5299,7 +5333,7 @@
           <a:blip r:embed="rId22">
             <a:extLst>
               <a:ext uri="{28A0092B-C50C-407E-A947-70E740481C1C}">
-                <a14:useLocalDpi xmlns:a14="http://schemas.microsoft.com/office/drawing/2010/main" val="0"/>
+                <a14:useLocalDpi xmlns:a14="http://schemas.microsoft.com/office/drawing/2010/main" xmlns="" val="0"/>
               </a:ext>
             </a:extLst>
           </a:blip>
@@ -5483,7 +5517,8 @@
           <a:p>
             <a:fld id="{4AAD347D-5ACD-4C99-B74B-A9C85AD731AF}" type="datetimeFigureOut">
               <a:rPr lang="en-US" dirty="0"/>
-              <a:t>12/14/2015</a:t>
+              <a:pPr/>
+              <a:t>2/5/2016</a:t>
             </a:fld>
             <a:endParaRPr lang="en-US" dirty="0"/>
           </a:p>
@@ -5562,6 +5597,7 @@
           <a:p>
             <a:fld id="{D57F1E4F-1CFF-5643-939E-02111984F565}" type="slidenum">
               <a:rPr lang="en-US" dirty="0"/>
+              <a:pPr/>
               <a:t>‹#›</a:t>
             </a:fld>
             <a:endParaRPr lang="en-US" dirty="0"/>
@@ -6019,7 +6055,7 @@
         </p:nvSpPr>
         <p:spPr>
           <a:xfrm>
-            <a:off x="520641" y="1604319"/>
+            <a:off x="520641" y="1413819"/>
             <a:ext cx="8825658" cy="3329581"/>
           </a:xfrm>
         </p:spPr>
@@ -6051,7 +6087,7 @@
         </p:nvSpPr>
         <p:spPr>
           <a:xfrm>
-            <a:off x="584886" y="4777381"/>
+            <a:off x="584886" y="4612281"/>
             <a:ext cx="11780107" cy="861420"/>
           </a:xfrm>
         </p:spPr>
@@ -6105,10 +6141,186 @@
           </a:p>
         </p:txBody>
       </p:sp>
+      <p:sp>
+        <p:nvSpPr>
+          <p:cNvPr id="4" name="TextBox 3"/>
+          <p:cNvSpPr txBox="1"/>
+          <p:nvPr/>
+        </p:nvSpPr>
+        <p:spPr>
+          <a:xfrm>
+            <a:off x="7454900" y="5448300"/>
+            <a:ext cx="4318000" cy="923330"/>
+          </a:xfrm>
+          <a:prstGeom prst="rect">
+            <a:avLst/>
+          </a:prstGeom>
+          <a:noFill/>
+        </p:spPr>
+        <p:txBody>
+          <a:bodyPr wrap="square" rtlCol="0">
+            <a:spAutoFit/>
+          </a:bodyPr>
+          <a:lstStyle/>
+          <a:p>
+            <a:r>
+              <a:rPr lang="en-GB" dirty="0" smtClean="0"/>
+              <a:t>AUTORI:</a:t>
+            </a:r>
+          </a:p>
+          <a:p>
+            <a:r>
+              <a:rPr lang="en-GB" dirty="0" smtClean="0"/>
+              <a:t>	</a:t>
+            </a:r>
+            <a:r>
+              <a:rPr lang="en-GB" dirty="0" smtClean="0"/>
+              <a:t>	RA 75/2012 Nikola </a:t>
+            </a:r>
+            <a:r>
+              <a:rPr lang="en-GB" dirty="0" err="1" smtClean="0"/>
+              <a:t>Todorovi</a:t>
+            </a:r>
+            <a:r>
+              <a:rPr lang="sr-Latn-RS" dirty="0" smtClean="0"/>
+              <a:t>ć</a:t>
+            </a:r>
+          </a:p>
+          <a:p>
+            <a:r>
+              <a:rPr lang="sr-Latn-RS" dirty="0" smtClean="0"/>
+              <a:t>	</a:t>
+            </a:r>
+            <a:r>
+              <a:rPr lang="sr-Latn-RS" dirty="0" smtClean="0"/>
+              <a:t>	RA 63/2012 David Vuletić</a:t>
+            </a:r>
+            <a:endParaRPr lang="en-US" dirty="0"/>
+          </a:p>
+        </p:txBody>
+      </p:sp>
+      <p:sp>
+        <p:nvSpPr>
+          <p:cNvPr id="5" name="TextBox 4"/>
+          <p:cNvSpPr txBox="1"/>
+          <p:nvPr/>
+        </p:nvSpPr>
+        <p:spPr>
+          <a:xfrm>
+            <a:off x="571500" y="5499100"/>
+            <a:ext cx="4318000" cy="923330"/>
+          </a:xfrm>
+          <a:prstGeom prst="rect">
+            <a:avLst/>
+          </a:prstGeom>
+          <a:noFill/>
+        </p:spPr>
+        <p:txBody>
+          <a:bodyPr wrap="square" rtlCol="0">
+            <a:spAutoFit/>
+          </a:bodyPr>
+          <a:lstStyle/>
+          <a:p>
+            <a:r>
+              <a:rPr lang="sr-Latn-RS" dirty="0" smtClean="0"/>
+              <a:t>MENTO</a:t>
+            </a:r>
+            <a:r>
+              <a:rPr lang="en-GB" dirty="0" smtClean="0"/>
+              <a:t>RI:</a:t>
+            </a:r>
+          </a:p>
+          <a:p>
+            <a:r>
+              <a:rPr lang="en-GB" dirty="0" smtClean="0"/>
+              <a:t>	</a:t>
+            </a:r>
+            <a:r>
+              <a:rPr lang="en-GB" dirty="0" smtClean="0"/>
+              <a:t>	</a:t>
+            </a:r>
+            <a:r>
+              <a:rPr lang="sr-Latn-RS" dirty="0" smtClean="0"/>
+              <a:t>PhD Obradović Đorđe</a:t>
+            </a:r>
+          </a:p>
+          <a:p>
+            <a:r>
+              <a:rPr lang="sr-Latn-RS" dirty="0" smtClean="0"/>
+              <a:t>	</a:t>
+            </a:r>
+            <a:r>
+              <a:rPr lang="sr-Latn-RS" dirty="0" smtClean="0"/>
+              <a:t>	Mihailo Isakov</a:t>
+            </a:r>
+            <a:endParaRPr lang="en-US" dirty="0"/>
+          </a:p>
+        </p:txBody>
+      </p:sp>
+      <p:sp>
+        <p:nvSpPr>
+          <p:cNvPr id="6" name="TextBox 5"/>
+          <p:cNvSpPr txBox="1"/>
+          <p:nvPr/>
+        </p:nvSpPr>
+        <p:spPr>
+          <a:xfrm>
+            <a:off x="711200" y="533400"/>
+            <a:ext cx="3365024" cy="369332"/>
+          </a:xfrm>
+          <a:prstGeom prst="rect">
+            <a:avLst/>
+          </a:prstGeom>
+          <a:noFill/>
+        </p:spPr>
+        <p:txBody>
+          <a:bodyPr wrap="none" rtlCol="0">
+            <a:spAutoFit/>
+          </a:bodyPr>
+          <a:lstStyle/>
+          <a:p>
+            <a:r>
+              <a:rPr lang="sr-Latn-RS" dirty="0" smtClean="0"/>
+              <a:t>UNIVERZITET U NOVOM SADU</a:t>
+            </a:r>
+            <a:endParaRPr lang="en-US" dirty="0"/>
+          </a:p>
+        </p:txBody>
+      </p:sp>
+      <p:sp>
+        <p:nvSpPr>
+          <p:cNvPr id="9" name="TextBox 8"/>
+          <p:cNvSpPr txBox="1"/>
+          <p:nvPr/>
+        </p:nvSpPr>
+        <p:spPr>
+          <a:xfrm>
+            <a:off x="7073900" y="546100"/>
+            <a:ext cx="3312125" cy="369332"/>
+          </a:xfrm>
+          <a:prstGeom prst="rect">
+            <a:avLst/>
+          </a:prstGeom>
+          <a:noFill/>
+        </p:spPr>
+        <p:txBody>
+          <a:bodyPr wrap="none" rtlCol="0">
+            <a:spAutoFit/>
+          </a:bodyPr>
+          <a:lstStyle/>
+          <a:p>
+            <a:r>
+              <a:rPr lang="sr-Latn-RS" dirty="0" smtClean="0"/>
+              <a:t>FAKULTET TEHNIČKIH  NAUKA</a:t>
+            </a:r>
+            <a:endParaRPr lang="en-US" dirty="0"/>
+          </a:p>
+        </p:txBody>
+      </p:sp>
     </p:spTree>
     <p:extLst>
       <p:ext uri="{BB962C8B-B14F-4D97-AF65-F5344CB8AC3E}">
-        <p14:creationId xmlns:p14="http://schemas.microsoft.com/office/powerpoint/2010/main" val="403837965"/>
+        <p14:creationId xmlns:p14="http://schemas.microsoft.com/office/powerpoint/2010/main" xmlns="" val="403837965"/>
       </p:ext>
     </p:extLst>
   </p:cSld>
@@ -6229,7 +6441,7 @@
     </p:spTree>
     <p:extLst>
       <p:ext uri="{BB962C8B-B14F-4D97-AF65-F5344CB8AC3E}">
-        <p14:creationId xmlns:p14="http://schemas.microsoft.com/office/powerpoint/2010/main" val="1814253999"/>
+        <p14:creationId xmlns:p14="http://schemas.microsoft.com/office/powerpoint/2010/main" xmlns="" val="1814253999"/>
       </p:ext>
     </p:extLst>
   </p:cSld>
@@ -6430,7 +6642,7 @@
     </p:spTree>
     <p:extLst>
       <p:ext uri="{BB962C8B-B14F-4D97-AF65-F5344CB8AC3E}">
-        <p14:creationId xmlns:p14="http://schemas.microsoft.com/office/powerpoint/2010/main" val="1332405399"/>
+        <p14:creationId xmlns:p14="http://schemas.microsoft.com/office/powerpoint/2010/main" xmlns="" val="1332405399"/>
       </p:ext>
     </p:extLst>
   </p:cSld>
@@ -6567,7 +6779,7 @@
     </p:spTree>
     <p:extLst>
       <p:ext uri="{BB962C8B-B14F-4D97-AF65-F5344CB8AC3E}">
-        <p14:creationId xmlns:p14="http://schemas.microsoft.com/office/powerpoint/2010/main" val="4289538619"/>
+        <p14:creationId xmlns:p14="http://schemas.microsoft.com/office/powerpoint/2010/main" xmlns="" val="4289538619"/>
       </p:ext>
     </p:extLst>
   </p:cSld>
@@ -6736,7 +6948,7 @@
     </p:spTree>
     <p:extLst>
       <p:ext uri="{BB962C8B-B14F-4D97-AF65-F5344CB8AC3E}">
-        <p14:creationId xmlns:p14="http://schemas.microsoft.com/office/powerpoint/2010/main" val="2853780976"/>
+        <p14:creationId xmlns:p14="http://schemas.microsoft.com/office/powerpoint/2010/main" xmlns="" val="2853780976"/>
       </p:ext>
     </p:extLst>
   </p:cSld>
@@ -7232,8 +7444,17 @@
           <a:p>
             <a:r>
               <a:rPr lang="sr-Latn-RS" dirty="0" smtClean="0"/>
-              <a:t>DOKAZANO SPORIJI OD NEAT METODE</a:t>
-            </a:r>
+              <a:t>DOKAZANO SPORIJI OD NEAT </a:t>
+            </a:r>
+            <a:r>
+              <a:rPr lang="sr-Latn-RS" dirty="0" smtClean="0"/>
+              <a:t>METODE </a:t>
+            </a:r>
+            <a:r>
+              <a:rPr lang="en-GB" smtClean="0"/>
+              <a:t>[1]</a:t>
+            </a:r>
+            <a:endParaRPr lang="sr-Latn-RS" dirty="0" smtClean="0"/>
           </a:p>
           <a:p>
             <a:endParaRPr lang="en-US" dirty="0"/>
@@ -7243,7 +7464,7 @@
     </p:spTree>
     <p:extLst>
       <p:ext uri="{BB962C8B-B14F-4D97-AF65-F5344CB8AC3E}">
-        <p14:creationId xmlns:p14="http://schemas.microsoft.com/office/powerpoint/2010/main" val="3349409834"/>
+        <p14:creationId xmlns:p14="http://schemas.microsoft.com/office/powerpoint/2010/main" xmlns="" val="3349409834"/>
       </p:ext>
     </p:extLst>
   </p:cSld>
@@ -7476,7 +7697,7 @@
     </p:spTree>
     <p:extLst>
       <p:ext uri="{BB962C8B-B14F-4D97-AF65-F5344CB8AC3E}">
-        <p14:creationId xmlns:p14="http://schemas.microsoft.com/office/powerpoint/2010/main" val="4107392833"/>
+        <p14:creationId xmlns:p14="http://schemas.microsoft.com/office/powerpoint/2010/main" xmlns="" val="4107392833"/>
       </p:ext>
     </p:extLst>
   </p:cSld>
@@ -7686,7 +7907,7 @@
     </p:spTree>
     <p:extLst>
       <p:ext uri="{BB962C8B-B14F-4D97-AF65-F5344CB8AC3E}">
-        <p14:creationId xmlns:p14="http://schemas.microsoft.com/office/powerpoint/2010/main" val="1489736055"/>
+        <p14:creationId xmlns:p14="http://schemas.microsoft.com/office/powerpoint/2010/main" xmlns="" val="1489736055"/>
       </p:ext>
     </p:extLst>
   </p:cSld>
@@ -8139,7 +8360,7 @@
     </p:spTree>
     <p:extLst>
       <p:ext uri="{BB962C8B-B14F-4D97-AF65-F5344CB8AC3E}">
-        <p14:creationId xmlns:p14="http://schemas.microsoft.com/office/powerpoint/2010/main" val="1686090500"/>
+        <p14:creationId xmlns:p14="http://schemas.microsoft.com/office/powerpoint/2010/main" xmlns="" val="1686090500"/>
       </p:ext>
     </p:extLst>
   </p:cSld>
@@ -8337,7 +8558,7 @@
     </p:spTree>
     <p:extLst>
       <p:ext uri="{BB962C8B-B14F-4D97-AF65-F5344CB8AC3E}">
-        <p14:creationId xmlns:p14="http://schemas.microsoft.com/office/powerpoint/2010/main" val="2889481502"/>
+        <p14:creationId xmlns:p14="http://schemas.microsoft.com/office/powerpoint/2010/main" xmlns="" val="2889481502"/>
       </p:ext>
     </p:extLst>
   </p:cSld>
@@ -8639,7 +8860,7 @@
     </p:spTree>
     <p:extLst>
       <p:ext uri="{BB962C8B-B14F-4D97-AF65-F5344CB8AC3E}">
-        <p14:creationId xmlns:p14="http://schemas.microsoft.com/office/powerpoint/2010/main" val="3479762430"/>
+        <p14:creationId xmlns:p14="http://schemas.microsoft.com/office/powerpoint/2010/main" xmlns="" val="3479762430"/>
       </p:ext>
     </p:extLst>
   </p:cSld>
@@ -8699,7 +8920,7 @@
     </a:clrScheme>
     <a:fontScheme name="Ion">
       <a:majorFont>
-        <a:latin typeface="Century Gothic" panose="020B0502020202020204"/>
+        <a:latin typeface="Century Gothic"/>
         <a:ea typeface=""/>
         <a:cs typeface=""/>
         <a:font script="Jpan" typeface="メイリオ"/>
@@ -8734,7 +8955,7 @@
         <a:font script="Geor" typeface="Sylfaen"/>
       </a:majorFont>
       <a:minorFont>
-        <a:latin typeface="Century Gothic" panose="020B0502020202020204"/>
+        <a:latin typeface="Century Gothic"/>
         <a:ea typeface=""/>
         <a:cs typeface=""/>
         <a:font script="Jpan" typeface="メイリオ"/>
@@ -8916,7 +9137,7 @@
   <a:extraClrSchemeLst/>
   <a:extLst>
     <a:ext uri="{05A4C25C-085E-4340-85A3-A5531E510DB2}">
-      <thm15:themeFamily xmlns:thm15="http://schemas.microsoft.com/office/thememl/2012/main" name="Ion" id="{B8441ADB-2E43-4AF7-B97A-BD870242C6A8}" vid="{292E63A9-BB86-4E3D-B92A-7223C6510D2E}"/>
+      <thm15:themeFamily xmlns:thm15="http://schemas.microsoft.com/office/thememl/2012/main" xmlns="" name="Ion" id="{B8441ADB-2E43-4AF7-B97A-BD870242C6A8}" vid="{292E63A9-BB86-4E3D-B92A-7223C6510D2E}"/>
     </a:ext>
   </a:extLst>
 </a:theme>

</xml_diff>